<commit_message>
Bổ xung tài liệu
</commit_message>
<xml_diff>
--- a/SpringBoot_Module04_VNPT2019_buiduchieuvnu.pptx
+++ b/SpringBoot_Module04_VNPT2019_buiduchieuvnu.pptx
@@ -8,7 +8,7 @@
     <p:notesMasterId r:id="rId5"/>
   </p:notesMasterIdLst>
   <p:handoutMasterIdLst>
-    <p:handoutMasterId r:id="rId53"/>
+    <p:handoutMasterId r:id="rId54"/>
   </p:handoutMasterIdLst>
   <p:sldIdLst>
     <p:sldId id="340" r:id="rId3"/>
@@ -57,9 +57,10 @@
     <p:sldId id="444" r:id="rId47"/>
     <p:sldId id="445" r:id="rId48"/>
     <p:sldId id="446" r:id="rId49"/>
-    <p:sldId id="447" r:id="rId50"/>
-    <p:sldId id="366" r:id="rId51"/>
-    <p:sldId id="371" r:id="rId52"/>
+    <p:sldId id="457" r:id="rId50"/>
+    <p:sldId id="447" r:id="rId51"/>
+    <p:sldId id="366" r:id="rId52"/>
+    <p:sldId id="371" r:id="rId53"/>
   </p:sldIdLst>
   <p:sldSz cx="9144000" cy="6858000" type="screen4x3"/>
   <p:notesSz cx="6997700" cy="9283700"/>
@@ -9548,14 +9549,7 @@
         <p:cNvGrpSpPr/>
         <p:nvPr/>
       </p:nvGrpSpPr>
-      <p:grpSpPr>
-        <a:xfrm>
-          <a:off x="0" y="0"/>
-          <a:ext cx="0" cy="0"/>
-          <a:chOff x="0" y="0"/>
-          <a:chExt cx="0" cy="0"/>
-        </a:xfrm>
-      </p:grpSpPr>
+      <p:grpSpPr/>
       <p:sp>
         <p:nvSpPr>
           <p:cNvPr id="2" name="Title 1"/>
@@ -9569,39 +9563,39 @@
         <p:spPr/>
         <p:txBody>
           <a:bodyPr/>
-          <a:lstStyle/>
-          <a:p>
-            <a:r>
-              <a:rPr lang="en-US" dirty="0" smtClean="0">
-                <a:sym typeface="+mn-ea"/>
-              </a:rPr>
-              <a:t>Module 04: Lab</a:t>
-            </a:r>
-            <a:endParaRPr lang="en-US" dirty="0" smtClean="0">
-              <a:sym typeface="+mn-ea"/>
-            </a:endParaRPr>
+          <a:p>
+            <a:r>
+              <a:rPr lang="en-US"/>
+              <a:t>Kiến trúc Microservice</a:t>
+            </a:r>
+            <a:endParaRPr lang="en-US"/>
           </a:p>
         </p:txBody>
       </p:sp>
-      <p:sp>
-        <p:nvSpPr>
-          <p:cNvPr id="3" name="Text Placeholder 2"/>
-          <p:cNvSpPr>
-            <a:spLocks noGrp="1"/>
-          </p:cNvSpPr>
-          <p:nvPr>
-            <p:ph type="body" sz="quarter" idx="12"/>
-          </p:nvPr>
-        </p:nvSpPr>
-        <p:spPr/>
-        <p:txBody>
-          <a:bodyPr/>
-          <a:lstStyle/>
-          <a:p>
-            <a:endParaRPr lang="en-US"/>
-          </a:p>
-        </p:txBody>
-      </p:sp>
+      <p:pic>
+        <p:nvPicPr>
+          <p:cNvPr id="3" name="Picture 2"/>
+          <p:cNvPicPr>
+            <a:picLocks noChangeAspect="1"/>
+          </p:cNvPicPr>
+          <p:nvPr/>
+        </p:nvPicPr>
+        <p:blipFill>
+          <a:blip r:embed="rId1"/>
+          <a:stretch>
+            <a:fillRect/>
+          </a:stretch>
+        </p:blipFill>
+        <p:spPr>
+          <a:xfrm>
+            <a:off x="748665" y="1034415"/>
+            <a:ext cx="7773670" cy="4916170"/>
+          </a:xfrm>
+          <a:prstGeom prst="rect">
+            <a:avLst/>
+          </a:prstGeom>
+        </p:spPr>
+      </p:pic>
     </p:spTree>
   </p:cSld>
   <p:clrMapOvr>
@@ -9610,13 +9604,6 @@
   <p:transition>
     <p:fade/>
   </p:transition>
-  <p:timing>
-    <p:tnLst>
-      <p:par>
-        <p:cTn id="1" dur="indefinite" restart="never" nodeType="tmRoot"/>
-      </p:par>
-    </p:tnLst>
-  </p:timing>
 </p:sld>
 </file>
 
@@ -9653,10 +9640,14 @@
           <a:lstStyle/>
           <a:p>
             <a:r>
-              <a:rPr lang="en-US" dirty="0" smtClean="0"/>
-              <a:t>Tài liệu tham khảo</a:t>
-            </a:r>
-            <a:endParaRPr lang="en-US" dirty="0"/>
+              <a:rPr lang="en-US" dirty="0" smtClean="0">
+                <a:sym typeface="+mn-ea"/>
+              </a:rPr>
+              <a:t>Module 04: Lab</a:t>
+            </a:r>
+            <a:endParaRPr lang="en-US" dirty="0" smtClean="0">
+              <a:sym typeface="+mn-ea"/>
+            </a:endParaRPr>
           </a:p>
         </p:txBody>
       </p:sp>
@@ -9667,7 +9658,7 @@
             <a:spLocks noGrp="1"/>
           </p:cNvSpPr>
           <p:nvPr>
-            <p:ph type="body" sz="quarter" idx="13"/>
+            <p:ph type="body" sz="quarter" idx="12"/>
           </p:nvPr>
         </p:nvSpPr>
         <p:spPr/>
@@ -9675,102 +9666,7 @@
           <a:bodyPr/>
           <a:lstStyle/>
           <a:p>
-            <a:pPr marL="0" indent="0">
-              <a:buNone/>
-            </a:pPr>
-            <a:r>
-              <a:rPr lang="en-US" dirty="0" smtClean="0"/>
-              <a:t>Spring</a:t>
-            </a:r>
-            <a:endParaRPr lang="en-US" dirty="0" smtClean="0"/>
-          </a:p>
-          <a:p>
-            <a:pPr lvl="1"/>
-            <a:r>
-              <a:rPr lang="en-US" dirty="0" smtClean="0"/>
-              <a:t>https</a:t>
-            </a:r>
-            <a:r>
-              <a:rPr lang="en-US" dirty="0"/>
-              <a:t>://</a:t>
-            </a:r>
-            <a:r>
-              <a:rPr lang="en-US" dirty="0" err="1"/>
-              <a:t>projects.spring.io</a:t>
-            </a:r>
-            <a:r>
-              <a:rPr lang="en-US" dirty="0"/>
-              <a:t>/spring-</a:t>
-            </a:r>
-            <a:r>
-              <a:rPr lang="en-US" dirty="0" smtClean="0"/>
-              <a:t>boot</a:t>
-            </a:r>
-            <a:endParaRPr lang="en-US" dirty="0" smtClean="0"/>
-          </a:p>
-          <a:p>
-            <a:pPr lvl="1"/>
-            <a:r>
-              <a:rPr lang="en-US" dirty="0">
-                <a:hlinkClick r:id="rId1"/>
-              </a:rPr>
-              <a:t>https://github.com/spring-projects/spring-boot</a:t>
-            </a:r>
-            <a:r>
-              <a:rPr lang="en-US" dirty="0"/>
-              <a:t> </a:t>
-            </a:r>
-            <a:r>
-              <a:rPr lang="en-US" dirty="0" smtClean="0"/>
-              <a:t>(on </a:t>
-            </a:r>
-            <a:r>
-              <a:rPr lang="en-US" dirty="0" err="1" smtClean="0"/>
-              <a:t>Github</a:t>
-            </a:r>
-            <a:r>
-              <a:rPr lang="en-US" dirty="0" smtClean="0"/>
-              <a:t>)</a:t>
-            </a:r>
-            <a:endParaRPr lang="en-US" dirty="0"/>
-          </a:p>
-          <a:p>
-            <a:pPr lvl="1"/>
-            <a:r>
-              <a:rPr lang="en-US" dirty="0" smtClean="0"/>
-              <a:t>http</a:t>
-            </a:r>
-            <a:r>
-              <a:rPr lang="en-US" dirty="0"/>
-              <a:t>://</a:t>
-            </a:r>
-            <a:r>
-              <a:rPr lang="en-US" dirty="0" err="1"/>
-              <a:t>spring.io</a:t>
-            </a:r>
-            <a:r>
-              <a:rPr lang="en-US" dirty="0"/>
-              <a:t>/blog/2013/09/20/contributing-to-spring-boot-with-a-pull-</a:t>
-            </a:r>
-            <a:r>
-              <a:rPr lang="en-US" dirty="0" smtClean="0"/>
-              <a:t>request</a:t>
-            </a:r>
-            <a:endParaRPr lang="en-US" dirty="0" smtClean="0"/>
-          </a:p>
-          <a:p>
-            <a:pPr lvl="1"/>
-            <a:r>
-              <a:rPr lang="en-US" dirty="0" smtClean="0"/>
-              <a:t>https://www.tutorialspoint.com/spring_boot/</a:t>
-            </a:r>
-            <a:endParaRPr lang="en-US" dirty="0" smtClean="0"/>
-          </a:p>
-          <a:p>
-            <a:pPr marL="0" indent="0">
-              <a:buNone/>
-            </a:pPr>
-            <a:endParaRPr lang="en-US" dirty="0"/>
+            <a:endParaRPr lang="en-US"/>
           </a:p>
         </p:txBody>
       </p:sp>
@@ -9816,7 +9712,7 @@
             <a:spLocks noGrp="1"/>
           </p:cNvSpPr>
           <p:nvPr>
-            <p:ph type="ctrTitle"/>
+            <p:ph type="title"/>
           </p:nvPr>
         </p:nvSpPr>
         <p:spPr/>
@@ -9826,8 +9722,122 @@
           <a:p>
             <a:r>
               <a:rPr lang="en-US" dirty="0" smtClean="0"/>
-              <a:t>Thanks!</a:t>
-            </a:r>
+              <a:t>Tài liệu tham khảo</a:t>
+            </a:r>
+            <a:endParaRPr lang="en-US" dirty="0"/>
+          </a:p>
+        </p:txBody>
+      </p:sp>
+      <p:sp>
+        <p:nvSpPr>
+          <p:cNvPr id="3" name="Text Placeholder 2"/>
+          <p:cNvSpPr>
+            <a:spLocks noGrp="1"/>
+          </p:cNvSpPr>
+          <p:nvPr>
+            <p:ph type="body" sz="quarter" idx="13"/>
+          </p:nvPr>
+        </p:nvSpPr>
+        <p:spPr/>
+        <p:txBody>
+          <a:bodyPr/>
+          <a:lstStyle/>
+          <a:p>
+            <a:pPr marL="0" indent="0">
+              <a:buNone/>
+            </a:pPr>
+            <a:r>
+              <a:rPr lang="en-US" dirty="0" smtClean="0"/>
+              <a:t>Spring</a:t>
+            </a:r>
+            <a:endParaRPr lang="en-US" dirty="0" smtClean="0"/>
+          </a:p>
+          <a:p>
+            <a:pPr lvl="1"/>
+            <a:r>
+              <a:rPr lang="en-US" dirty="0" smtClean="0"/>
+              <a:t>https</a:t>
+            </a:r>
+            <a:r>
+              <a:rPr lang="en-US" dirty="0"/>
+              <a:t>://</a:t>
+            </a:r>
+            <a:r>
+              <a:rPr lang="en-US" dirty="0" err="1"/>
+              <a:t>projects.spring.io</a:t>
+            </a:r>
+            <a:r>
+              <a:rPr lang="en-US" dirty="0"/>
+              <a:t>/spring-</a:t>
+            </a:r>
+            <a:r>
+              <a:rPr lang="en-US" dirty="0" smtClean="0"/>
+              <a:t>boot</a:t>
+            </a:r>
+            <a:endParaRPr lang="en-US" dirty="0" smtClean="0"/>
+          </a:p>
+          <a:p>
+            <a:pPr lvl="1"/>
+            <a:r>
+              <a:rPr lang="en-US" dirty="0">
+                <a:hlinkClick r:id="rId1"/>
+              </a:rPr>
+              <a:t>https://github.com/spring-projects/spring-boot</a:t>
+            </a:r>
+            <a:r>
+              <a:rPr lang="en-US" dirty="0"/>
+              <a:t> </a:t>
+            </a:r>
+            <a:r>
+              <a:rPr lang="en-US" dirty="0" smtClean="0"/>
+              <a:t>(on </a:t>
+            </a:r>
+            <a:r>
+              <a:rPr lang="en-US" dirty="0" err="1" smtClean="0"/>
+              <a:t>Github</a:t>
+            </a:r>
+            <a:r>
+              <a:rPr lang="en-US" dirty="0" smtClean="0"/>
+              <a:t>)</a:t>
+            </a:r>
+            <a:endParaRPr lang="en-US" dirty="0"/>
+          </a:p>
+          <a:p>
+            <a:pPr lvl="1"/>
+            <a:r>
+              <a:rPr lang="en-US" dirty="0" smtClean="0"/>
+              <a:t>http</a:t>
+            </a:r>
+            <a:r>
+              <a:rPr lang="en-US" dirty="0"/>
+              <a:t>://</a:t>
+            </a:r>
+            <a:r>
+              <a:rPr lang="en-US" dirty="0" err="1"/>
+              <a:t>spring.io</a:t>
+            </a:r>
+            <a:r>
+              <a:rPr lang="en-US" dirty="0"/>
+              <a:t>/blog/2013/09/20/contributing-to-spring-boot-with-a-pull-</a:t>
+            </a:r>
+            <a:r>
+              <a:rPr lang="en-US" dirty="0" smtClean="0"/>
+              <a:t>request</a:t>
+            </a:r>
+            <a:endParaRPr lang="en-US" dirty="0" smtClean="0"/>
+          </a:p>
+          <a:p>
+            <a:pPr lvl="1"/>
+            <a:r>
+              <a:rPr lang="en-US" dirty="0" smtClean="0"/>
+              <a:t>https://www.tutorialspoint.com/spring_boot/</a:t>
+            </a:r>
+            <a:endParaRPr lang="en-US" dirty="0" smtClean="0"/>
+          </a:p>
+          <a:p>
+            <a:pPr marL="0" indent="0">
+              <a:buNone/>
+            </a:pPr>
             <a:endParaRPr lang="en-US" dirty="0"/>
           </a:p>
         </p:txBody>
@@ -12884,6 +12894,64 @@
 </p:sld>
 </file>
 
+<file path=ppt/slides/slide50.xml><?xml version="1.0" encoding="utf-8"?>
+<p:sld xmlns:a="http://schemas.openxmlformats.org/drawingml/2006/main" xmlns:r="http://schemas.openxmlformats.org/officeDocument/2006/relationships" xmlns:p="http://schemas.openxmlformats.org/presentationml/2006/main">
+  <p:cSld>
+    <p:spTree>
+      <p:nvGrpSpPr>
+        <p:cNvPr id="1" name=""/>
+        <p:cNvGrpSpPr/>
+        <p:nvPr/>
+      </p:nvGrpSpPr>
+      <p:grpSpPr>
+        <a:xfrm>
+          <a:off x="0" y="0"/>
+          <a:ext cx="0" cy="0"/>
+          <a:chOff x="0" y="0"/>
+          <a:chExt cx="0" cy="0"/>
+        </a:xfrm>
+      </p:grpSpPr>
+      <p:sp>
+        <p:nvSpPr>
+          <p:cNvPr id="2" name="Title 1"/>
+          <p:cNvSpPr>
+            <a:spLocks noGrp="1"/>
+          </p:cNvSpPr>
+          <p:nvPr>
+            <p:ph type="ctrTitle"/>
+          </p:nvPr>
+        </p:nvSpPr>
+        <p:spPr/>
+        <p:txBody>
+          <a:bodyPr/>
+          <a:lstStyle/>
+          <a:p>
+            <a:r>
+              <a:rPr lang="en-US" dirty="0" smtClean="0"/>
+              <a:t>Thanks!</a:t>
+            </a:r>
+            <a:endParaRPr lang="en-US" dirty="0"/>
+          </a:p>
+        </p:txBody>
+      </p:sp>
+    </p:spTree>
+  </p:cSld>
+  <p:clrMapOvr>
+    <a:masterClrMapping/>
+  </p:clrMapOvr>
+  <p:transition>
+    <p:fade/>
+  </p:transition>
+  <p:timing>
+    <p:tnLst>
+      <p:par>
+        <p:cTn id="1" dur="indefinite" restart="never" nodeType="tmRoot"/>
+      </p:par>
+    </p:tnLst>
+  </p:timing>
+</p:sld>
+</file>
+
 <file path=ppt/slides/slide6.xml><?xml version="1.0" encoding="utf-8"?>
 <p:sld xmlns:a="http://schemas.openxmlformats.org/drawingml/2006/main" xmlns:r="http://schemas.openxmlformats.org/officeDocument/2006/relationships" xmlns:p="http://schemas.openxmlformats.org/presentationml/2006/main">
   <p:cSld>

</xml_diff>